<commit_message>
Add new results to long-term scenario
</commit_message>
<xml_diff>
--- a/data_and_results/!Reports/total and partial reports/2098.12 - 2099.12 - wyniki/2098.12 - 2099.12 - raport finansowy.pptx
+++ b/data_and_results/!Reports/total and partial reports/2098.12 - 2099.12 - wyniki/2098.12 - 2099.12 - raport finansowy.pptx
@@ -25,6 +25,7 @@
     <p:sldId id="273" r:id="rId24"/>
     <p:sldId id="274" r:id="rId25"/>
     <p:sldId id="275" r:id="rId26"/>
+    <p:sldId id="276" r:id="rId27"/>
   </p:sldIdLst>
   <p:sldSz cx="9144000" cy="6858000" type="screen4x3"/>
   <p:notesSz cx="6858000" cy="9144000"/>
@@ -3179,8 +3180,8 @@
         </p:blipFill>
         <p:spPr>
           <a:xfrm>
-            <a:off x="1371600" y="0"/>
-            <a:ext cx="6858000" cy="6858000"/>
+            <a:off x="457200" y="0"/>
+            <a:ext cx="8229600" cy="6858000"/>
           </a:xfrm>
           <a:prstGeom prst="rect">
             <a:avLst/>
@@ -3221,8 +3222,8 @@
         </p:blipFill>
         <p:spPr>
           <a:xfrm>
-            <a:off x="1371600" y="0"/>
-            <a:ext cx="6858000" cy="6858000"/>
+            <a:off x="457200" y="0"/>
+            <a:ext cx="8229600" cy="6858000"/>
           </a:xfrm>
           <a:prstGeom prst="rect">
             <a:avLst/>
@@ -3685,6 +3686,48 @@
 </p:sld>
 </file>
 
+<file path=ppt/slides/slide21.xml><?xml version="1.0" encoding="utf-8"?>
+<p:sld xmlns:a="http://schemas.openxmlformats.org/drawingml/2006/main" xmlns:p="http://schemas.openxmlformats.org/presentationml/2006/main" xmlns:r="http://schemas.openxmlformats.org/officeDocument/2006/relationships">
+  <p:cSld>
+    <p:spTree>
+      <p:nvGrpSpPr>
+        <p:cNvPr id="1" name=""/>
+        <p:cNvGrpSpPr/>
+        <p:nvPr/>
+      </p:nvGrpSpPr>
+      <p:grpSpPr/>
+      <p:pic>
+        <p:nvPicPr>
+          <p:cNvPr id="2" name="Picture 1" descr="plot17.png"/>
+          <p:cNvPicPr>
+            <a:picLocks noChangeAspect="1"/>
+          </p:cNvPicPr>
+          <p:nvPr/>
+        </p:nvPicPr>
+        <p:blipFill>
+          <a:blip r:embed="rId2"/>
+          <a:stretch>
+            <a:fillRect/>
+          </a:stretch>
+        </p:blipFill>
+        <p:spPr>
+          <a:xfrm>
+            <a:off x="0" y="91440"/>
+            <a:ext cx="9601200" cy="6400800"/>
+          </a:xfrm>
+          <a:prstGeom prst="rect">
+            <a:avLst/>
+          </a:prstGeom>
+        </p:spPr>
+      </p:pic>
+    </p:spTree>
+  </p:cSld>
+  <p:clrMapOvr>
+    <a:masterClrMapping/>
+  </p:clrMapOvr>
+</p:sld>
+</file>
+
 <file path=ppt/slides/slide3.xml><?xml version="1.0" encoding="utf-8"?>
 <p:sld xmlns:a="http://schemas.openxmlformats.org/drawingml/2006/main" xmlns:p="http://schemas.openxmlformats.org/presentationml/2006/main" xmlns:r="http://schemas.openxmlformats.org/officeDocument/2006/relationships">
   <p:cSld>
@@ -3711,8 +3754,8 @@
         </p:blipFill>
         <p:spPr>
           <a:xfrm>
-            <a:off x="1371600" y="0"/>
-            <a:ext cx="6858000" cy="6858000"/>
+            <a:off x="457200" y="0"/>
+            <a:ext cx="8229600" cy="6858000"/>
           </a:xfrm>
           <a:prstGeom prst="rect">
             <a:avLst/>
@@ -3753,8 +3796,8 @@
         </p:blipFill>
         <p:spPr>
           <a:xfrm>
-            <a:off x="1371600" y="0"/>
-            <a:ext cx="6858000" cy="6858000"/>
+            <a:off x="457200" y="0"/>
+            <a:ext cx="8229600" cy="6858000"/>
           </a:xfrm>
           <a:prstGeom prst="rect">
             <a:avLst/>
@@ -3795,8 +3838,8 @@
         </p:blipFill>
         <p:spPr>
           <a:xfrm>
-            <a:off x="1371600" y="0"/>
-            <a:ext cx="6858000" cy="6858000"/>
+            <a:off x="457200" y="0"/>
+            <a:ext cx="8229600" cy="6858000"/>
           </a:xfrm>
           <a:prstGeom prst="rect">
             <a:avLst/>
@@ -3837,8 +3880,8 @@
         </p:blipFill>
         <p:spPr>
           <a:xfrm>
-            <a:off x="1371600" y="0"/>
-            <a:ext cx="6858000" cy="6858000"/>
+            <a:off x="457200" y="0"/>
+            <a:ext cx="8229600" cy="6858000"/>
           </a:xfrm>
           <a:prstGeom prst="rect">
             <a:avLst/>
@@ -3879,8 +3922,8 @@
         </p:blipFill>
         <p:spPr>
           <a:xfrm>
-            <a:off x="1371600" y="0"/>
-            <a:ext cx="6858000" cy="6858000"/>
+            <a:off x="457200" y="0"/>
+            <a:ext cx="8229600" cy="6858000"/>
           </a:xfrm>
           <a:prstGeom prst="rect">
             <a:avLst/>
@@ -3977,8 +4020,8 @@
         </p:blipFill>
         <p:spPr>
           <a:xfrm>
-            <a:off x="1371600" y="0"/>
-            <a:ext cx="6858000" cy="6858000"/>
+            <a:off x="457200" y="0"/>
+            <a:ext cx="8229600" cy="6858000"/>
           </a:xfrm>
           <a:prstGeom prst="rect">
             <a:avLst/>

</xml_diff>